<commit_message>
fix: effect inference @ CPS transformation
git-svn-id: file:///home/ryosuke/repos_test/mochi@631 382e5e6e-cd79-4ffa-aa24-b240b7b59e18
</commit_message>
<xml_diff>
--- a/PEPM2013/overall.pptx
+++ b/PEPM2013/overall.pptx
@@ -7,7 +7,7 @@
   <p:sldIdLst>
     <p:sldId id="257" r:id="rId2"/>
   </p:sldIdLst>
-  <p:sldSz cx="8820150" cy="6121400"/>
+  <p:sldSz cx="8567738" cy="6372225"/>
   <p:notesSz cx="7099300" cy="10234613"/>
   <p:defaultTextStyle>
     <a:defPPr>
@@ -107,12 +107,12 @@
   <p:extLst>
     <p:ext uri="{EFAFB233-063F-42B5-8137-9DF3F51BA10A}">
       <p15:sldGuideLst xmlns:p15="http://schemas.microsoft.com/office/powerpoint/2012/main">
-        <p15:guide id="1" orient="horz" pos="1928" userDrawn="1">
+        <p15:guide id="1" orient="horz" pos="2007" userDrawn="1">
           <p15:clr>
             <a:srgbClr val="A4A3A4"/>
           </p15:clr>
         </p15:guide>
-        <p15:guide id="2" pos="2778" userDrawn="1">
+        <p15:guide id="2" pos="2699" userDrawn="1">
           <p15:clr>
             <a:srgbClr val="A4A3A4"/>
           </p15:clr>
@@ -152,8 +152,8 @@
         </p:nvSpPr>
         <p:spPr>
           <a:xfrm>
-            <a:off x="661514" y="1901617"/>
-            <a:ext cx="7497127" cy="1312133"/>
+            <a:off x="642582" y="1979537"/>
+            <a:ext cx="7282578" cy="1365898"/>
           </a:xfrm>
         </p:spPr>
         <p:txBody>
@@ -180,8 +180,8 @@
         </p:nvSpPr>
         <p:spPr>
           <a:xfrm>
-            <a:off x="1323024" y="3468793"/>
-            <a:ext cx="6174105" cy="1564358"/>
+            <a:off x="1285168" y="3610931"/>
+            <a:ext cx="5997417" cy="1628458"/>
           </a:xfrm>
         </p:spPr>
         <p:txBody>
@@ -197,7 +197,7 @@
                 </a:solidFill>
               </a:defRPr>
             </a:lvl1pPr>
-            <a:lvl2pPr marL="519515" indent="0" algn="ctr">
+            <a:lvl2pPr marL="451969" indent="0" algn="ctr">
               <a:buNone/>
               <a:defRPr>
                 <a:solidFill>
@@ -207,7 +207,7 @@
                 </a:solidFill>
               </a:defRPr>
             </a:lvl2pPr>
-            <a:lvl3pPr marL="1039029" indent="0" algn="ctr">
+            <a:lvl3pPr marL="903939" indent="0" algn="ctr">
               <a:buNone/>
               <a:defRPr>
                 <a:solidFill>
@@ -217,7 +217,7 @@
                 </a:solidFill>
               </a:defRPr>
             </a:lvl3pPr>
-            <a:lvl4pPr marL="1558542" indent="0" algn="ctr">
+            <a:lvl4pPr marL="1355906" indent="0" algn="ctr">
               <a:buNone/>
               <a:defRPr>
                 <a:solidFill>
@@ -227,7 +227,7 @@
                 </a:solidFill>
               </a:defRPr>
             </a:lvl4pPr>
-            <a:lvl5pPr marL="2078055" indent="0" algn="ctr">
+            <a:lvl5pPr marL="1807876" indent="0" algn="ctr">
               <a:buNone/>
               <a:defRPr>
                 <a:solidFill>
@@ -237,7 +237,7 @@
                 </a:solidFill>
               </a:defRPr>
             </a:lvl5pPr>
-            <a:lvl6pPr marL="2597570" indent="0" algn="ctr">
+            <a:lvl6pPr marL="2259845" indent="0" algn="ctr">
               <a:buNone/>
               <a:defRPr>
                 <a:solidFill>
@@ -247,7 +247,7 @@
                 </a:solidFill>
               </a:defRPr>
             </a:lvl6pPr>
-            <a:lvl7pPr marL="3117083" indent="0" algn="ctr">
+            <a:lvl7pPr marL="2711813" indent="0" algn="ctr">
               <a:buNone/>
               <a:defRPr>
                 <a:solidFill>
@@ -257,7 +257,7 @@
                 </a:solidFill>
               </a:defRPr>
             </a:lvl7pPr>
-            <a:lvl8pPr marL="3636598" indent="0" algn="ctr">
+            <a:lvl8pPr marL="3163783" indent="0" algn="ctr">
               <a:buNone/>
               <a:defRPr>
                 <a:solidFill>
@@ -267,7 +267,7 @@
                 </a:solidFill>
               </a:defRPr>
             </a:lvl8pPr>
-            <a:lvl9pPr marL="4156111" indent="0" algn="ctr">
+            <a:lvl9pPr marL="3615749" indent="0" algn="ctr">
               <a:buNone/>
               <a:defRPr>
                 <a:solidFill>
@@ -305,7 +305,7 @@
             <a:fld id="{93281789-98A6-4526-8BB2-AB6D89D147DD}" type="datetimeFigureOut">
               <a:rPr kumimoji="1" lang="ja-JP" altLang="en-US" smtClean="0"/>
               <a:pPr/>
-              <a:t>2012/9/26</a:t>
+              <a:t>2012/10/5</a:t>
             </a:fld>
             <a:endParaRPr kumimoji="1" lang="ja-JP" altLang="en-US"/>
           </a:p>
@@ -504,7 +504,7 @@
             <a:fld id="{93281789-98A6-4526-8BB2-AB6D89D147DD}" type="datetimeFigureOut">
               <a:rPr kumimoji="1" lang="ja-JP" altLang="en-US" smtClean="0"/>
               <a:pPr/>
-              <a:t>2012/9/26</a:t>
+              <a:t>2012/10/5</a:t>
             </a:fld>
             <a:endParaRPr kumimoji="1" lang="ja-JP" altLang="en-US"/>
           </a:p>
@@ -590,8 +590,8 @@
         </p:nvSpPr>
         <p:spPr>
           <a:xfrm>
-            <a:off x="6394613" y="245146"/>
-            <a:ext cx="1984533" cy="5223028"/>
+            <a:off x="6211618" y="255193"/>
+            <a:ext cx="1927740" cy="5437044"/>
           </a:xfrm>
         </p:spPr>
         <p:txBody>
@@ -618,8 +618,8 @@
         </p:nvSpPr>
         <p:spPr>
           <a:xfrm>
-            <a:off x="441010" y="245146"/>
-            <a:ext cx="5806598" cy="5223028"/>
+            <a:off x="428394" y="255193"/>
+            <a:ext cx="5640427" cy="5437044"/>
           </a:xfrm>
         </p:spPr>
         <p:txBody>
@@ -713,7 +713,7 @@
             <a:fld id="{93281789-98A6-4526-8BB2-AB6D89D147DD}" type="datetimeFigureOut">
               <a:rPr kumimoji="1" lang="ja-JP" altLang="en-US" smtClean="0"/>
               <a:pPr/>
-              <a:t>2012/9/26</a:t>
+              <a:t>2012/10/5</a:t>
             </a:fld>
             <a:endParaRPr kumimoji="1" lang="ja-JP" altLang="en-US"/>
           </a:p>
@@ -912,7 +912,7 @@
             <a:fld id="{93281789-98A6-4526-8BB2-AB6D89D147DD}" type="datetimeFigureOut">
               <a:rPr kumimoji="1" lang="ja-JP" altLang="en-US" smtClean="0"/>
               <a:pPr/>
-              <a:t>2012/9/26</a:t>
+              <a:t>2012/10/5</a:t>
             </a:fld>
             <a:endParaRPr kumimoji="1" lang="ja-JP" altLang="en-US"/>
           </a:p>
@@ -998,15 +998,15 @@
         </p:nvSpPr>
         <p:spPr>
           <a:xfrm>
-            <a:off x="696736" y="3933572"/>
-            <a:ext cx="7497127" cy="1215778"/>
+            <a:off x="676801" y="4094756"/>
+            <a:ext cx="7282578" cy="1265594"/>
           </a:xfrm>
         </p:spPr>
         <p:txBody>
           <a:bodyPr anchor="t"/>
           <a:lstStyle>
             <a:lvl1pPr algn="l">
-              <a:defRPr sz="4546" b="1" cap="all"/>
+              <a:defRPr sz="3954" b="1" cap="all"/>
             </a:lvl1pPr>
           </a:lstStyle>
           <a:p>
@@ -1030,8 +1030,8 @@
         </p:nvSpPr>
         <p:spPr>
           <a:xfrm>
-            <a:off x="696736" y="2594517"/>
-            <a:ext cx="7497127" cy="1339056"/>
+            <a:off x="676801" y="2700833"/>
+            <a:ext cx="7282578" cy="1393924"/>
           </a:xfrm>
         </p:spPr>
         <p:txBody>
@@ -1039,7 +1039,7 @@
           <a:lstStyle>
             <a:lvl1pPr marL="0" indent="0">
               <a:buNone/>
-              <a:defRPr sz="2273">
+              <a:defRPr sz="1978">
                 <a:solidFill>
                   <a:schemeClr val="tx1">
                     <a:tint val="75000"/>
@@ -1047,9 +1047,9 @@
                 </a:solidFill>
               </a:defRPr>
             </a:lvl1pPr>
-            <a:lvl2pPr marL="519515" indent="0">
-              <a:buNone/>
-              <a:defRPr sz="2046">
+            <a:lvl2pPr marL="451969" indent="0">
+              <a:buNone/>
+              <a:defRPr sz="1780">
                 <a:solidFill>
                   <a:schemeClr val="tx1">
                     <a:tint val="75000"/>
@@ -1057,9 +1057,9 @@
                 </a:solidFill>
               </a:defRPr>
             </a:lvl2pPr>
-            <a:lvl3pPr marL="1039029" indent="0">
-              <a:buNone/>
-              <a:defRPr sz="1819">
+            <a:lvl3pPr marL="903939" indent="0">
+              <a:buNone/>
+              <a:defRPr sz="1582">
                 <a:solidFill>
                   <a:schemeClr val="tx1">
                     <a:tint val="75000"/>
@@ -1067,9 +1067,9 @@
                 </a:solidFill>
               </a:defRPr>
             </a:lvl3pPr>
-            <a:lvl4pPr marL="1558542" indent="0">
-              <a:buNone/>
-              <a:defRPr sz="1591">
+            <a:lvl4pPr marL="1355906" indent="0">
+              <a:buNone/>
+              <a:defRPr sz="1384">
                 <a:solidFill>
                   <a:schemeClr val="tx1">
                     <a:tint val="75000"/>
@@ -1077,9 +1077,9 @@
                 </a:solidFill>
               </a:defRPr>
             </a:lvl4pPr>
-            <a:lvl5pPr marL="2078055" indent="0">
-              <a:buNone/>
-              <a:defRPr sz="1591">
+            <a:lvl5pPr marL="1807876" indent="0">
+              <a:buNone/>
+              <a:defRPr sz="1384">
                 <a:solidFill>
                   <a:schemeClr val="tx1">
                     <a:tint val="75000"/>
@@ -1087,9 +1087,9 @@
                 </a:solidFill>
               </a:defRPr>
             </a:lvl5pPr>
-            <a:lvl6pPr marL="2597570" indent="0">
-              <a:buNone/>
-              <a:defRPr sz="1591">
+            <a:lvl6pPr marL="2259845" indent="0">
+              <a:buNone/>
+              <a:defRPr sz="1384">
                 <a:solidFill>
                   <a:schemeClr val="tx1">
                     <a:tint val="75000"/>
@@ -1097,9 +1097,9 @@
                 </a:solidFill>
               </a:defRPr>
             </a:lvl6pPr>
-            <a:lvl7pPr marL="3117083" indent="0">
-              <a:buNone/>
-              <a:defRPr sz="1591">
+            <a:lvl7pPr marL="2711813" indent="0">
+              <a:buNone/>
+              <a:defRPr sz="1384">
                 <a:solidFill>
                   <a:schemeClr val="tx1">
                     <a:tint val="75000"/>
@@ -1107,9 +1107,9 @@
                 </a:solidFill>
               </a:defRPr>
             </a:lvl7pPr>
-            <a:lvl8pPr marL="3636598" indent="0">
-              <a:buNone/>
-              <a:defRPr sz="1591">
+            <a:lvl8pPr marL="3163783" indent="0">
+              <a:buNone/>
+              <a:defRPr sz="1384">
                 <a:solidFill>
                   <a:schemeClr val="tx1">
                     <a:tint val="75000"/>
@@ -1117,9 +1117,9 @@
                 </a:solidFill>
               </a:defRPr>
             </a:lvl8pPr>
-            <a:lvl9pPr marL="4156111" indent="0">
-              <a:buNone/>
-              <a:defRPr sz="1591">
+            <a:lvl9pPr marL="3615749" indent="0">
+              <a:buNone/>
+              <a:defRPr sz="1384">
                 <a:solidFill>
                   <a:schemeClr val="tx1">
                     <a:tint val="75000"/>
@@ -1155,7 +1155,7 @@
             <a:fld id="{93281789-98A6-4526-8BB2-AB6D89D147DD}" type="datetimeFigureOut">
               <a:rPr kumimoji="1" lang="ja-JP" altLang="en-US" smtClean="0"/>
               <a:pPr/>
-              <a:t>2012/9/26</a:t>
+              <a:t>2012/10/5</a:t>
             </a:fld>
             <a:endParaRPr kumimoji="1" lang="ja-JP" altLang="en-US"/>
           </a:p>
@@ -1264,39 +1264,39 @@
         </p:nvSpPr>
         <p:spPr>
           <a:xfrm>
-            <a:off x="441011" y="1428339"/>
-            <a:ext cx="3895565" cy="4039841"/>
+            <a:off x="428398" y="1486866"/>
+            <a:ext cx="3784083" cy="4205374"/>
           </a:xfrm>
         </p:spPr>
         <p:txBody>
           <a:bodyPr/>
           <a:lstStyle>
             <a:lvl1pPr>
-              <a:defRPr sz="3182"/>
+              <a:defRPr sz="2768"/>
             </a:lvl1pPr>
             <a:lvl2pPr>
-              <a:defRPr sz="2727"/>
+              <a:defRPr sz="2372"/>
             </a:lvl2pPr>
             <a:lvl3pPr>
-              <a:defRPr sz="2273"/>
+              <a:defRPr sz="1978"/>
             </a:lvl3pPr>
             <a:lvl4pPr>
-              <a:defRPr sz="2046"/>
+              <a:defRPr sz="1780"/>
             </a:lvl4pPr>
             <a:lvl5pPr>
-              <a:defRPr sz="2046"/>
+              <a:defRPr sz="1780"/>
             </a:lvl5pPr>
             <a:lvl6pPr>
-              <a:defRPr sz="2046"/>
+              <a:defRPr sz="1780"/>
             </a:lvl6pPr>
             <a:lvl7pPr>
-              <a:defRPr sz="2046"/>
+              <a:defRPr sz="1780"/>
             </a:lvl7pPr>
             <a:lvl8pPr>
-              <a:defRPr sz="2046"/>
+              <a:defRPr sz="1780"/>
             </a:lvl8pPr>
             <a:lvl9pPr>
-              <a:defRPr sz="2046"/>
+              <a:defRPr sz="1780"/>
             </a:lvl9pPr>
           </a:lstStyle>
           <a:p>
@@ -1381,39 +1381,39 @@
         </p:nvSpPr>
         <p:spPr>
           <a:xfrm>
-            <a:off x="4483580" y="1428339"/>
-            <a:ext cx="3895565" cy="4039841"/>
+            <a:off x="4355274" y="1486866"/>
+            <a:ext cx="3784083" cy="4205374"/>
           </a:xfrm>
         </p:spPr>
         <p:txBody>
           <a:bodyPr/>
           <a:lstStyle>
             <a:lvl1pPr>
-              <a:defRPr sz="3182"/>
+              <a:defRPr sz="2768"/>
             </a:lvl1pPr>
             <a:lvl2pPr>
-              <a:defRPr sz="2727"/>
+              <a:defRPr sz="2372"/>
             </a:lvl2pPr>
             <a:lvl3pPr>
-              <a:defRPr sz="2273"/>
+              <a:defRPr sz="1978"/>
             </a:lvl3pPr>
             <a:lvl4pPr>
-              <a:defRPr sz="2046"/>
+              <a:defRPr sz="1780"/>
             </a:lvl4pPr>
             <a:lvl5pPr>
-              <a:defRPr sz="2046"/>
+              <a:defRPr sz="1780"/>
             </a:lvl5pPr>
             <a:lvl6pPr>
-              <a:defRPr sz="2046"/>
+              <a:defRPr sz="1780"/>
             </a:lvl6pPr>
             <a:lvl7pPr>
-              <a:defRPr sz="2046"/>
+              <a:defRPr sz="1780"/>
             </a:lvl7pPr>
             <a:lvl8pPr>
-              <a:defRPr sz="2046"/>
+              <a:defRPr sz="1780"/>
             </a:lvl8pPr>
             <a:lvl9pPr>
-              <a:defRPr sz="2046"/>
+              <a:defRPr sz="1780"/>
             </a:lvl9pPr>
           </a:lstStyle>
           <a:p>
@@ -1504,7 +1504,7 @@
             <a:fld id="{93281789-98A6-4526-8BB2-AB6D89D147DD}" type="datetimeFigureOut">
               <a:rPr kumimoji="1" lang="ja-JP" altLang="en-US" smtClean="0"/>
               <a:pPr/>
-              <a:t>2012/9/26</a:t>
+              <a:t>2012/10/5</a:t>
             </a:fld>
             <a:endParaRPr kumimoji="1" lang="ja-JP" altLang="en-US"/>
           </a:p>
@@ -1617,8 +1617,8 @@
         </p:nvSpPr>
         <p:spPr>
           <a:xfrm>
-            <a:off x="441009" y="1370234"/>
-            <a:ext cx="3897097" cy="571048"/>
+            <a:off x="428398" y="1426380"/>
+            <a:ext cx="3785571" cy="594448"/>
           </a:xfrm>
         </p:spPr>
         <p:txBody>
@@ -1626,39 +1626,39 @@
           <a:lstStyle>
             <a:lvl1pPr marL="0" indent="0">
               <a:buNone/>
-              <a:defRPr sz="2727" b="1"/>
+              <a:defRPr sz="2372" b="1"/>
             </a:lvl1pPr>
-            <a:lvl2pPr marL="519515" indent="0">
-              <a:buNone/>
-              <a:defRPr sz="2273" b="1"/>
+            <a:lvl2pPr marL="451969" indent="0">
+              <a:buNone/>
+              <a:defRPr sz="1978" b="1"/>
             </a:lvl2pPr>
-            <a:lvl3pPr marL="1039029" indent="0">
-              <a:buNone/>
-              <a:defRPr sz="2046" b="1"/>
+            <a:lvl3pPr marL="903939" indent="0">
+              <a:buNone/>
+              <a:defRPr sz="1780" b="1"/>
             </a:lvl3pPr>
-            <a:lvl4pPr marL="1558542" indent="0">
-              <a:buNone/>
-              <a:defRPr sz="1819" b="1"/>
+            <a:lvl4pPr marL="1355906" indent="0">
+              <a:buNone/>
+              <a:defRPr sz="1582" b="1"/>
             </a:lvl4pPr>
-            <a:lvl5pPr marL="2078055" indent="0">
-              <a:buNone/>
-              <a:defRPr sz="1819" b="1"/>
+            <a:lvl5pPr marL="1807876" indent="0">
+              <a:buNone/>
+              <a:defRPr sz="1582" b="1"/>
             </a:lvl5pPr>
-            <a:lvl6pPr marL="2597570" indent="0">
-              <a:buNone/>
-              <a:defRPr sz="1819" b="1"/>
+            <a:lvl6pPr marL="2259845" indent="0">
+              <a:buNone/>
+              <a:defRPr sz="1582" b="1"/>
             </a:lvl6pPr>
-            <a:lvl7pPr marL="3117083" indent="0">
-              <a:buNone/>
-              <a:defRPr sz="1819" b="1"/>
+            <a:lvl7pPr marL="2711813" indent="0">
+              <a:buNone/>
+              <a:defRPr sz="1582" b="1"/>
             </a:lvl7pPr>
-            <a:lvl8pPr marL="3636598" indent="0">
-              <a:buNone/>
-              <a:defRPr sz="1819" b="1"/>
+            <a:lvl8pPr marL="3163783" indent="0">
+              <a:buNone/>
+              <a:defRPr sz="1582" b="1"/>
             </a:lvl8pPr>
-            <a:lvl9pPr marL="4156111" indent="0">
-              <a:buNone/>
-              <a:defRPr sz="1819" b="1"/>
+            <a:lvl9pPr marL="3615749" indent="0">
+              <a:buNone/>
+              <a:defRPr sz="1582" b="1"/>
             </a:lvl9pPr>
           </a:lstStyle>
           <a:p>
@@ -1682,39 +1682,39 @@
         </p:nvSpPr>
         <p:spPr>
           <a:xfrm>
-            <a:off x="441009" y="1941278"/>
-            <a:ext cx="3897097" cy="3526890"/>
+            <a:off x="428398" y="2020826"/>
+            <a:ext cx="3785571" cy="3671404"/>
           </a:xfrm>
         </p:spPr>
         <p:txBody>
           <a:bodyPr/>
           <a:lstStyle>
             <a:lvl1pPr>
-              <a:defRPr sz="2727"/>
+              <a:defRPr sz="2372"/>
             </a:lvl1pPr>
             <a:lvl2pPr>
-              <a:defRPr sz="2273"/>
+              <a:defRPr sz="1978"/>
             </a:lvl2pPr>
             <a:lvl3pPr>
-              <a:defRPr sz="2046"/>
+              <a:defRPr sz="1780"/>
             </a:lvl3pPr>
             <a:lvl4pPr>
-              <a:defRPr sz="1819"/>
+              <a:defRPr sz="1582"/>
             </a:lvl4pPr>
             <a:lvl5pPr>
-              <a:defRPr sz="1819"/>
+              <a:defRPr sz="1582"/>
             </a:lvl5pPr>
             <a:lvl6pPr>
-              <a:defRPr sz="1819"/>
+              <a:defRPr sz="1582"/>
             </a:lvl6pPr>
             <a:lvl7pPr>
-              <a:defRPr sz="1819"/>
+              <a:defRPr sz="1582"/>
             </a:lvl7pPr>
             <a:lvl8pPr>
-              <a:defRPr sz="1819"/>
+              <a:defRPr sz="1582"/>
             </a:lvl8pPr>
             <a:lvl9pPr>
-              <a:defRPr sz="1819"/>
+              <a:defRPr sz="1582"/>
             </a:lvl9pPr>
           </a:lstStyle>
           <a:p>
@@ -1799,8 +1799,8 @@
         </p:nvSpPr>
         <p:spPr>
           <a:xfrm>
-            <a:off x="4480519" y="1370234"/>
-            <a:ext cx="3898630" cy="571048"/>
+            <a:off x="4352302" y="1426380"/>
+            <a:ext cx="3787061" cy="594448"/>
           </a:xfrm>
         </p:spPr>
         <p:txBody>
@@ -1808,39 +1808,39 @@
           <a:lstStyle>
             <a:lvl1pPr marL="0" indent="0">
               <a:buNone/>
-              <a:defRPr sz="2727" b="1"/>
+              <a:defRPr sz="2372" b="1"/>
             </a:lvl1pPr>
-            <a:lvl2pPr marL="519515" indent="0">
-              <a:buNone/>
-              <a:defRPr sz="2273" b="1"/>
+            <a:lvl2pPr marL="451969" indent="0">
+              <a:buNone/>
+              <a:defRPr sz="1978" b="1"/>
             </a:lvl2pPr>
-            <a:lvl3pPr marL="1039029" indent="0">
-              <a:buNone/>
-              <a:defRPr sz="2046" b="1"/>
+            <a:lvl3pPr marL="903939" indent="0">
+              <a:buNone/>
+              <a:defRPr sz="1780" b="1"/>
             </a:lvl3pPr>
-            <a:lvl4pPr marL="1558542" indent="0">
-              <a:buNone/>
-              <a:defRPr sz="1819" b="1"/>
+            <a:lvl4pPr marL="1355906" indent="0">
+              <a:buNone/>
+              <a:defRPr sz="1582" b="1"/>
             </a:lvl4pPr>
-            <a:lvl5pPr marL="2078055" indent="0">
-              <a:buNone/>
-              <a:defRPr sz="1819" b="1"/>
+            <a:lvl5pPr marL="1807876" indent="0">
+              <a:buNone/>
+              <a:defRPr sz="1582" b="1"/>
             </a:lvl5pPr>
-            <a:lvl6pPr marL="2597570" indent="0">
-              <a:buNone/>
-              <a:defRPr sz="1819" b="1"/>
+            <a:lvl6pPr marL="2259845" indent="0">
+              <a:buNone/>
+              <a:defRPr sz="1582" b="1"/>
             </a:lvl6pPr>
-            <a:lvl7pPr marL="3117083" indent="0">
-              <a:buNone/>
-              <a:defRPr sz="1819" b="1"/>
+            <a:lvl7pPr marL="2711813" indent="0">
+              <a:buNone/>
+              <a:defRPr sz="1582" b="1"/>
             </a:lvl7pPr>
-            <a:lvl8pPr marL="3636598" indent="0">
-              <a:buNone/>
-              <a:defRPr sz="1819" b="1"/>
+            <a:lvl8pPr marL="3163783" indent="0">
+              <a:buNone/>
+              <a:defRPr sz="1582" b="1"/>
             </a:lvl8pPr>
-            <a:lvl9pPr marL="4156111" indent="0">
-              <a:buNone/>
-              <a:defRPr sz="1819" b="1"/>
+            <a:lvl9pPr marL="3615749" indent="0">
+              <a:buNone/>
+              <a:defRPr sz="1582" b="1"/>
             </a:lvl9pPr>
           </a:lstStyle>
           <a:p>
@@ -1864,39 +1864,39 @@
         </p:nvSpPr>
         <p:spPr>
           <a:xfrm>
-            <a:off x="4480519" y="1941278"/>
-            <a:ext cx="3898630" cy="3526890"/>
+            <a:off x="4352302" y="2020826"/>
+            <a:ext cx="3787061" cy="3671404"/>
           </a:xfrm>
         </p:spPr>
         <p:txBody>
           <a:bodyPr/>
           <a:lstStyle>
             <a:lvl1pPr>
-              <a:defRPr sz="2727"/>
+              <a:defRPr sz="2372"/>
             </a:lvl1pPr>
             <a:lvl2pPr>
-              <a:defRPr sz="2273"/>
+              <a:defRPr sz="1978"/>
             </a:lvl2pPr>
             <a:lvl3pPr>
-              <a:defRPr sz="2046"/>
+              <a:defRPr sz="1780"/>
             </a:lvl3pPr>
             <a:lvl4pPr>
-              <a:defRPr sz="1819"/>
+              <a:defRPr sz="1582"/>
             </a:lvl4pPr>
             <a:lvl5pPr>
-              <a:defRPr sz="1819"/>
+              <a:defRPr sz="1582"/>
             </a:lvl5pPr>
             <a:lvl6pPr>
-              <a:defRPr sz="1819"/>
+              <a:defRPr sz="1582"/>
             </a:lvl6pPr>
             <a:lvl7pPr>
-              <a:defRPr sz="1819"/>
+              <a:defRPr sz="1582"/>
             </a:lvl7pPr>
             <a:lvl8pPr>
-              <a:defRPr sz="1819"/>
+              <a:defRPr sz="1582"/>
             </a:lvl8pPr>
             <a:lvl9pPr>
-              <a:defRPr sz="1819"/>
+              <a:defRPr sz="1582"/>
             </a:lvl9pPr>
           </a:lstStyle>
           <a:p>
@@ -1987,7 +1987,7 @@
             <a:fld id="{93281789-98A6-4526-8BB2-AB6D89D147DD}" type="datetimeFigureOut">
               <a:rPr kumimoji="1" lang="ja-JP" altLang="en-US" smtClean="0"/>
               <a:pPr/>
-              <a:t>2012/9/26</a:t>
+              <a:t>2012/10/5</a:t>
             </a:fld>
             <a:endParaRPr kumimoji="1" lang="ja-JP" altLang="en-US"/>
           </a:p>
@@ -2102,7 +2102,7 @@
             <a:fld id="{93281789-98A6-4526-8BB2-AB6D89D147DD}" type="datetimeFigureOut">
               <a:rPr kumimoji="1" lang="ja-JP" altLang="en-US" smtClean="0"/>
               <a:pPr/>
-              <a:t>2012/9/26</a:t>
+              <a:t>2012/10/5</a:t>
             </a:fld>
             <a:endParaRPr kumimoji="1" lang="ja-JP" altLang="en-US"/>
           </a:p>
@@ -2194,7 +2194,7 @@
             <a:fld id="{93281789-98A6-4526-8BB2-AB6D89D147DD}" type="datetimeFigureOut">
               <a:rPr kumimoji="1" lang="ja-JP" altLang="en-US" smtClean="0"/>
               <a:pPr/>
-              <a:t>2012/9/26</a:t>
+              <a:t>2012/10/5</a:t>
             </a:fld>
             <a:endParaRPr kumimoji="1" lang="ja-JP" altLang="en-US"/>
           </a:p>
@@ -2280,15 +2280,15 @@
         </p:nvSpPr>
         <p:spPr>
           <a:xfrm>
-            <a:off x="441013" y="243726"/>
-            <a:ext cx="2901767" cy="1037238"/>
+            <a:off x="428401" y="253715"/>
+            <a:ext cx="2818725" cy="1079738"/>
           </a:xfrm>
         </p:spPr>
         <p:txBody>
           <a:bodyPr anchor="b"/>
           <a:lstStyle>
             <a:lvl1pPr algn="l">
-              <a:defRPr sz="2273" b="1"/>
+              <a:defRPr sz="1978" b="1"/>
             </a:lvl1pPr>
           </a:lstStyle>
           <a:p>
@@ -2312,39 +2312,39 @@
         </p:nvSpPr>
         <p:spPr>
           <a:xfrm>
-            <a:off x="3448438" y="243737"/>
-            <a:ext cx="4930708" cy="5224445"/>
+            <a:off x="3349754" y="253726"/>
+            <a:ext cx="4789603" cy="5438517"/>
           </a:xfrm>
         </p:spPr>
         <p:txBody>
           <a:bodyPr/>
           <a:lstStyle>
             <a:lvl1pPr>
-              <a:defRPr sz="3637"/>
+              <a:defRPr sz="3165"/>
             </a:lvl1pPr>
             <a:lvl2pPr>
-              <a:defRPr sz="3182"/>
+              <a:defRPr sz="2768"/>
             </a:lvl2pPr>
             <a:lvl3pPr>
-              <a:defRPr sz="2727"/>
+              <a:defRPr sz="2372"/>
             </a:lvl3pPr>
             <a:lvl4pPr>
-              <a:defRPr sz="2273"/>
+              <a:defRPr sz="1978"/>
             </a:lvl4pPr>
             <a:lvl5pPr>
-              <a:defRPr sz="2273"/>
+              <a:defRPr sz="1978"/>
             </a:lvl5pPr>
             <a:lvl6pPr>
-              <a:defRPr sz="2273"/>
+              <a:defRPr sz="1978"/>
             </a:lvl6pPr>
             <a:lvl7pPr>
-              <a:defRPr sz="2273"/>
+              <a:defRPr sz="1978"/>
             </a:lvl7pPr>
             <a:lvl8pPr>
-              <a:defRPr sz="2273"/>
+              <a:defRPr sz="1978"/>
             </a:lvl8pPr>
             <a:lvl9pPr>
-              <a:defRPr sz="2273"/>
+              <a:defRPr sz="1978"/>
             </a:lvl9pPr>
           </a:lstStyle>
           <a:p>
@@ -2429,8 +2429,8 @@
         </p:nvSpPr>
         <p:spPr>
           <a:xfrm>
-            <a:off x="441013" y="1280963"/>
-            <a:ext cx="2901767" cy="4187208"/>
+            <a:off x="428401" y="1333452"/>
+            <a:ext cx="2818725" cy="4358780"/>
           </a:xfrm>
         </p:spPr>
         <p:txBody>
@@ -2438,39 +2438,39 @@
           <a:lstStyle>
             <a:lvl1pPr marL="0" indent="0">
               <a:buNone/>
-              <a:defRPr sz="1591"/>
+              <a:defRPr sz="1384"/>
             </a:lvl1pPr>
-            <a:lvl2pPr marL="519515" indent="0">
-              <a:buNone/>
-              <a:defRPr sz="1364"/>
+            <a:lvl2pPr marL="451969" indent="0">
+              <a:buNone/>
+              <a:defRPr sz="1186"/>
             </a:lvl2pPr>
-            <a:lvl3pPr marL="1039029" indent="0">
-              <a:buNone/>
-              <a:defRPr sz="1136"/>
+            <a:lvl3pPr marL="903939" indent="0">
+              <a:buNone/>
+              <a:defRPr sz="988"/>
             </a:lvl3pPr>
-            <a:lvl4pPr marL="1558542" indent="0">
-              <a:buNone/>
-              <a:defRPr sz="1023"/>
+            <a:lvl4pPr marL="1355906" indent="0">
+              <a:buNone/>
+              <a:defRPr sz="891"/>
             </a:lvl4pPr>
-            <a:lvl5pPr marL="2078055" indent="0">
-              <a:buNone/>
-              <a:defRPr sz="1023"/>
+            <a:lvl5pPr marL="1807876" indent="0">
+              <a:buNone/>
+              <a:defRPr sz="891"/>
             </a:lvl5pPr>
-            <a:lvl6pPr marL="2597570" indent="0">
-              <a:buNone/>
-              <a:defRPr sz="1023"/>
+            <a:lvl6pPr marL="2259845" indent="0">
+              <a:buNone/>
+              <a:defRPr sz="891"/>
             </a:lvl6pPr>
-            <a:lvl7pPr marL="3117083" indent="0">
-              <a:buNone/>
-              <a:defRPr sz="1023"/>
+            <a:lvl7pPr marL="2711813" indent="0">
+              <a:buNone/>
+              <a:defRPr sz="891"/>
             </a:lvl7pPr>
-            <a:lvl8pPr marL="3636598" indent="0">
-              <a:buNone/>
-              <a:defRPr sz="1023"/>
+            <a:lvl8pPr marL="3163783" indent="0">
+              <a:buNone/>
+              <a:defRPr sz="891"/>
             </a:lvl8pPr>
-            <a:lvl9pPr marL="4156111" indent="0">
-              <a:buNone/>
-              <a:defRPr sz="1023"/>
+            <a:lvl9pPr marL="3615749" indent="0">
+              <a:buNone/>
+              <a:defRPr sz="891"/>
             </a:lvl9pPr>
           </a:lstStyle>
           <a:p>
@@ -2500,7 +2500,7 @@
             <a:fld id="{93281789-98A6-4526-8BB2-AB6D89D147DD}" type="datetimeFigureOut">
               <a:rPr kumimoji="1" lang="ja-JP" altLang="en-US" smtClean="0"/>
               <a:pPr/>
-              <a:t>2012/9/26</a:t>
+              <a:t>2012/10/5</a:t>
             </a:fld>
             <a:endParaRPr kumimoji="1" lang="ja-JP" altLang="en-US"/>
           </a:p>
@@ -2586,15 +2586,15 @@
         </p:nvSpPr>
         <p:spPr>
           <a:xfrm>
-            <a:off x="1728814" y="4284992"/>
-            <a:ext cx="5292090" cy="505867"/>
+            <a:off x="1679344" y="4460573"/>
+            <a:ext cx="5140643" cy="526596"/>
           </a:xfrm>
         </p:spPr>
         <p:txBody>
           <a:bodyPr anchor="b"/>
           <a:lstStyle>
             <a:lvl1pPr algn="l">
-              <a:defRPr sz="2273" b="1"/>
+              <a:defRPr sz="1978" b="1"/>
             </a:lvl1pPr>
           </a:lstStyle>
           <a:p>
@@ -2618,8 +2618,8 @@
         </p:nvSpPr>
         <p:spPr>
           <a:xfrm>
-            <a:off x="1728814" y="546958"/>
-            <a:ext cx="5292090" cy="3672840"/>
+            <a:off x="1679344" y="569371"/>
+            <a:ext cx="5140643" cy="3823335"/>
           </a:xfrm>
         </p:spPr>
         <p:txBody>
@@ -2627,39 +2627,39 @@
           <a:lstStyle>
             <a:lvl1pPr marL="0" indent="0">
               <a:buNone/>
-              <a:defRPr sz="3637"/>
+              <a:defRPr sz="3165"/>
             </a:lvl1pPr>
-            <a:lvl2pPr marL="519515" indent="0">
-              <a:buNone/>
-              <a:defRPr sz="3182"/>
+            <a:lvl2pPr marL="451969" indent="0">
+              <a:buNone/>
+              <a:defRPr sz="2768"/>
             </a:lvl2pPr>
-            <a:lvl3pPr marL="1039029" indent="0">
-              <a:buNone/>
-              <a:defRPr sz="2727"/>
+            <a:lvl3pPr marL="903939" indent="0">
+              <a:buNone/>
+              <a:defRPr sz="2372"/>
             </a:lvl3pPr>
-            <a:lvl4pPr marL="1558542" indent="0">
-              <a:buNone/>
-              <a:defRPr sz="2273"/>
+            <a:lvl4pPr marL="1355906" indent="0">
+              <a:buNone/>
+              <a:defRPr sz="1978"/>
             </a:lvl4pPr>
-            <a:lvl5pPr marL="2078055" indent="0">
-              <a:buNone/>
-              <a:defRPr sz="2273"/>
+            <a:lvl5pPr marL="1807876" indent="0">
+              <a:buNone/>
+              <a:defRPr sz="1978"/>
             </a:lvl5pPr>
-            <a:lvl6pPr marL="2597570" indent="0">
-              <a:buNone/>
-              <a:defRPr sz="2273"/>
+            <a:lvl6pPr marL="2259845" indent="0">
+              <a:buNone/>
+              <a:defRPr sz="1978"/>
             </a:lvl6pPr>
-            <a:lvl7pPr marL="3117083" indent="0">
-              <a:buNone/>
-              <a:defRPr sz="2273"/>
+            <a:lvl7pPr marL="2711813" indent="0">
+              <a:buNone/>
+              <a:defRPr sz="1978"/>
             </a:lvl7pPr>
-            <a:lvl8pPr marL="3636598" indent="0">
-              <a:buNone/>
-              <a:defRPr sz="2273"/>
+            <a:lvl8pPr marL="3163783" indent="0">
+              <a:buNone/>
+              <a:defRPr sz="1978"/>
             </a:lvl8pPr>
-            <a:lvl9pPr marL="4156111" indent="0">
-              <a:buNone/>
-              <a:defRPr sz="2273"/>
+            <a:lvl9pPr marL="3615749" indent="0">
+              <a:buNone/>
+              <a:defRPr sz="1978"/>
             </a:lvl9pPr>
           </a:lstStyle>
           <a:p>
@@ -2679,8 +2679,8 @@
         </p:nvSpPr>
         <p:spPr>
           <a:xfrm>
-            <a:off x="1728814" y="4790861"/>
-            <a:ext cx="5292090" cy="718415"/>
+            <a:off x="1679344" y="4987170"/>
+            <a:ext cx="5140643" cy="747851"/>
           </a:xfrm>
         </p:spPr>
         <p:txBody>
@@ -2688,39 +2688,39 @@
           <a:lstStyle>
             <a:lvl1pPr marL="0" indent="0">
               <a:buNone/>
-              <a:defRPr sz="1591"/>
+              <a:defRPr sz="1384"/>
             </a:lvl1pPr>
-            <a:lvl2pPr marL="519515" indent="0">
-              <a:buNone/>
-              <a:defRPr sz="1364"/>
+            <a:lvl2pPr marL="451969" indent="0">
+              <a:buNone/>
+              <a:defRPr sz="1186"/>
             </a:lvl2pPr>
-            <a:lvl3pPr marL="1039029" indent="0">
-              <a:buNone/>
-              <a:defRPr sz="1136"/>
+            <a:lvl3pPr marL="903939" indent="0">
+              <a:buNone/>
+              <a:defRPr sz="988"/>
             </a:lvl3pPr>
-            <a:lvl4pPr marL="1558542" indent="0">
-              <a:buNone/>
-              <a:defRPr sz="1023"/>
+            <a:lvl4pPr marL="1355906" indent="0">
+              <a:buNone/>
+              <a:defRPr sz="891"/>
             </a:lvl4pPr>
-            <a:lvl5pPr marL="2078055" indent="0">
-              <a:buNone/>
-              <a:defRPr sz="1023"/>
+            <a:lvl5pPr marL="1807876" indent="0">
+              <a:buNone/>
+              <a:defRPr sz="891"/>
             </a:lvl5pPr>
-            <a:lvl6pPr marL="2597570" indent="0">
-              <a:buNone/>
-              <a:defRPr sz="1023"/>
+            <a:lvl6pPr marL="2259845" indent="0">
+              <a:buNone/>
+              <a:defRPr sz="891"/>
             </a:lvl6pPr>
-            <a:lvl7pPr marL="3117083" indent="0">
-              <a:buNone/>
-              <a:defRPr sz="1023"/>
+            <a:lvl7pPr marL="2711813" indent="0">
+              <a:buNone/>
+              <a:defRPr sz="891"/>
             </a:lvl7pPr>
-            <a:lvl8pPr marL="3636598" indent="0">
-              <a:buNone/>
-              <a:defRPr sz="1023"/>
+            <a:lvl8pPr marL="3163783" indent="0">
+              <a:buNone/>
+              <a:defRPr sz="891"/>
             </a:lvl8pPr>
-            <a:lvl9pPr marL="4156111" indent="0">
-              <a:buNone/>
-              <a:defRPr sz="1023"/>
+            <a:lvl9pPr marL="3615749" indent="0">
+              <a:buNone/>
+              <a:defRPr sz="891"/>
             </a:lvl9pPr>
           </a:lstStyle>
           <a:p>
@@ -2750,7 +2750,7 @@
             <a:fld id="{93281789-98A6-4526-8BB2-AB6D89D147DD}" type="datetimeFigureOut">
               <a:rPr kumimoji="1" lang="ja-JP" altLang="en-US" smtClean="0"/>
               <a:pPr/>
-              <a:t>2012/9/26</a:t>
+              <a:t>2012/10/5</a:t>
             </a:fld>
             <a:endParaRPr kumimoji="1" lang="ja-JP" altLang="en-US"/>
           </a:p>
@@ -2841,8 +2841,8 @@
         </p:nvSpPr>
         <p:spPr>
           <a:xfrm>
-            <a:off x="441010" y="245148"/>
-            <a:ext cx="7938135" cy="1020233"/>
+            <a:off x="428389" y="255198"/>
+            <a:ext cx="7710964" cy="1062038"/>
           </a:xfrm>
           <a:prstGeom prst="rect">
             <a:avLst/>
@@ -2874,8 +2874,8 @@
         </p:nvSpPr>
         <p:spPr>
           <a:xfrm>
-            <a:off x="441010" y="1428339"/>
-            <a:ext cx="7938135" cy="4039841"/>
+            <a:off x="428389" y="1486866"/>
+            <a:ext cx="7710964" cy="4205374"/>
           </a:xfrm>
           <a:prstGeom prst="rect">
             <a:avLst/>
@@ -2968,8 +2968,8 @@
         </p:nvSpPr>
         <p:spPr>
           <a:xfrm>
-            <a:off x="441010" y="5673637"/>
-            <a:ext cx="2058034" cy="325908"/>
+            <a:off x="428390" y="5906117"/>
+            <a:ext cx="1999138" cy="339263"/>
           </a:xfrm>
           <a:prstGeom prst="rect">
             <a:avLst/>
@@ -2979,7 +2979,7 @@
           <a:bodyPr vert="horz" lIns="91424" tIns="45711" rIns="91424" bIns="45711" rtlCol="0" anchor="ctr"/>
           <a:lstStyle>
             <a:lvl1pPr algn="l">
-              <a:defRPr sz="1364">
+              <a:defRPr sz="1186">
                 <a:solidFill>
                   <a:schemeClr val="tx1">
                     <a:tint val="75000"/>
@@ -2992,7 +2992,7 @@
             <a:fld id="{93281789-98A6-4526-8BB2-AB6D89D147DD}" type="datetimeFigureOut">
               <a:rPr kumimoji="1" lang="ja-JP" altLang="en-US" smtClean="0"/>
               <a:pPr/>
-              <a:t>2012/9/26</a:t>
+              <a:t>2012/10/5</a:t>
             </a:fld>
             <a:endParaRPr kumimoji="1" lang="ja-JP" altLang="en-US"/>
           </a:p>
@@ -3010,8 +3010,8 @@
         </p:nvSpPr>
         <p:spPr>
           <a:xfrm>
-            <a:off x="3013554" y="5673637"/>
-            <a:ext cx="2793048" cy="325908"/>
+            <a:off x="2927317" y="5906117"/>
+            <a:ext cx="2713117" cy="339263"/>
           </a:xfrm>
           <a:prstGeom prst="rect">
             <a:avLst/>
@@ -3021,7 +3021,7 @@
           <a:bodyPr vert="horz" lIns="91424" tIns="45711" rIns="91424" bIns="45711" rtlCol="0" anchor="ctr"/>
           <a:lstStyle>
             <a:lvl1pPr algn="ctr">
-              <a:defRPr sz="1364">
+              <a:defRPr sz="1186">
                 <a:solidFill>
                   <a:schemeClr val="tx1">
                     <a:tint val="75000"/>
@@ -3047,8 +3047,8 @@
         </p:nvSpPr>
         <p:spPr>
           <a:xfrm>
-            <a:off x="6321110" y="5673637"/>
-            <a:ext cx="2058034" cy="325908"/>
+            <a:off x="6140216" y="5906117"/>
+            <a:ext cx="1999138" cy="339263"/>
           </a:xfrm>
           <a:prstGeom prst="rect">
             <a:avLst/>
@@ -3058,7 +3058,7 @@
           <a:bodyPr vert="horz" lIns="91424" tIns="45711" rIns="91424" bIns="45711" rtlCol="0" anchor="ctr"/>
           <a:lstStyle>
             <a:lvl1pPr algn="r">
-              <a:defRPr sz="1364">
+              <a:defRPr sz="1186">
                 <a:solidFill>
                   <a:schemeClr val="tx1">
                     <a:tint val="75000"/>
@@ -3095,12 +3095,12 @@
   </p:sldLayoutIdLst>
   <p:txStyles>
     <p:titleStyle>
-      <a:lvl1pPr algn="ctr" defTabSz="1039029" rtl="0" eaLnBrk="1" latinLnBrk="0" hangingPunct="1">
+      <a:lvl1pPr algn="ctr" defTabSz="903939" rtl="0" eaLnBrk="1" latinLnBrk="0" hangingPunct="1">
         <a:spcBef>
           <a:spcPct val="0"/>
         </a:spcBef>
         <a:buNone/>
-        <a:defRPr kumimoji="1" sz="5000" kern="1200">
+        <a:defRPr kumimoji="1" sz="4350" kern="1200">
           <a:solidFill>
             <a:schemeClr val="tx1"/>
           </a:solidFill>
@@ -3111,13 +3111,13 @@
       </a:lvl1pPr>
     </p:titleStyle>
     <p:bodyStyle>
-      <a:lvl1pPr marL="389635" indent="-389635" algn="l" defTabSz="1039029" rtl="0" eaLnBrk="1" latinLnBrk="0" hangingPunct="1">
+      <a:lvl1pPr marL="338977" indent="-338977" algn="l" defTabSz="903939" rtl="0" eaLnBrk="1" latinLnBrk="0" hangingPunct="1">
         <a:spcBef>
           <a:spcPct val="20000"/>
         </a:spcBef>
         <a:buFont typeface="Arial" pitchFamily="34" charset="0"/>
         <a:buChar char="•"/>
-        <a:defRPr kumimoji="1" sz="3637" kern="1200">
+        <a:defRPr kumimoji="1" sz="3165" kern="1200">
           <a:solidFill>
             <a:schemeClr val="tx1"/>
           </a:solidFill>
@@ -3126,13 +3126,13 @@
           <a:cs typeface="+mn-cs"/>
         </a:defRPr>
       </a:lvl1pPr>
-      <a:lvl2pPr marL="844210" indent="-324697" algn="l" defTabSz="1039029" rtl="0" eaLnBrk="1" latinLnBrk="0" hangingPunct="1">
+      <a:lvl2pPr marL="734449" indent="-282482" algn="l" defTabSz="903939" rtl="0" eaLnBrk="1" latinLnBrk="0" hangingPunct="1">
         <a:spcBef>
           <a:spcPct val="20000"/>
         </a:spcBef>
         <a:buFont typeface="Arial" pitchFamily="34" charset="0"/>
         <a:buChar char="–"/>
-        <a:defRPr kumimoji="1" sz="3182" kern="1200">
+        <a:defRPr kumimoji="1" sz="2768" kern="1200">
           <a:solidFill>
             <a:schemeClr val="tx1"/>
           </a:solidFill>
@@ -3141,13 +3141,13 @@
           <a:cs typeface="+mn-cs"/>
         </a:defRPr>
       </a:lvl2pPr>
-      <a:lvl3pPr marL="1298785" indent="-259756" algn="l" defTabSz="1039029" rtl="0" eaLnBrk="1" latinLnBrk="0" hangingPunct="1">
+      <a:lvl3pPr marL="1129922" indent="-225983" algn="l" defTabSz="903939" rtl="0" eaLnBrk="1" latinLnBrk="0" hangingPunct="1">
         <a:spcBef>
           <a:spcPct val="20000"/>
         </a:spcBef>
         <a:buFont typeface="Arial" pitchFamily="34" charset="0"/>
         <a:buChar char="•"/>
-        <a:defRPr kumimoji="1" sz="2727" kern="1200">
+        <a:defRPr kumimoji="1" sz="2372" kern="1200">
           <a:solidFill>
             <a:schemeClr val="tx1"/>
           </a:solidFill>
@@ -3156,13 +3156,13 @@
           <a:cs typeface="+mn-cs"/>
         </a:defRPr>
       </a:lvl3pPr>
-      <a:lvl4pPr marL="1818299" indent="-259756" algn="l" defTabSz="1039029" rtl="0" eaLnBrk="1" latinLnBrk="0" hangingPunct="1">
+      <a:lvl4pPr marL="1581892" indent="-225983" algn="l" defTabSz="903939" rtl="0" eaLnBrk="1" latinLnBrk="0" hangingPunct="1">
         <a:spcBef>
           <a:spcPct val="20000"/>
         </a:spcBef>
         <a:buFont typeface="Arial" pitchFamily="34" charset="0"/>
         <a:buChar char="–"/>
-        <a:defRPr kumimoji="1" sz="2273" kern="1200">
+        <a:defRPr kumimoji="1" sz="1978" kern="1200">
           <a:solidFill>
             <a:schemeClr val="tx1"/>
           </a:solidFill>
@@ -3171,13 +3171,13 @@
           <a:cs typeface="+mn-cs"/>
         </a:defRPr>
       </a:lvl4pPr>
-      <a:lvl5pPr marL="2337812" indent="-259756" algn="l" defTabSz="1039029" rtl="0" eaLnBrk="1" latinLnBrk="0" hangingPunct="1">
+      <a:lvl5pPr marL="2033858" indent="-225983" algn="l" defTabSz="903939" rtl="0" eaLnBrk="1" latinLnBrk="0" hangingPunct="1">
         <a:spcBef>
           <a:spcPct val="20000"/>
         </a:spcBef>
         <a:buFont typeface="Arial" pitchFamily="34" charset="0"/>
         <a:buChar char="»"/>
-        <a:defRPr kumimoji="1" sz="2273" kern="1200">
+        <a:defRPr kumimoji="1" sz="1978" kern="1200">
           <a:solidFill>
             <a:schemeClr val="tx1"/>
           </a:solidFill>
@@ -3186,13 +3186,13 @@
           <a:cs typeface="+mn-cs"/>
         </a:defRPr>
       </a:lvl5pPr>
-      <a:lvl6pPr marL="2857326" indent="-259756" algn="l" defTabSz="1039029" rtl="0" eaLnBrk="1" latinLnBrk="0" hangingPunct="1">
+      <a:lvl6pPr marL="2485828" indent="-225983" algn="l" defTabSz="903939" rtl="0" eaLnBrk="1" latinLnBrk="0" hangingPunct="1">
         <a:spcBef>
           <a:spcPct val="20000"/>
         </a:spcBef>
         <a:buFont typeface="Arial" pitchFamily="34" charset="0"/>
         <a:buChar char="•"/>
-        <a:defRPr kumimoji="1" sz="2273" kern="1200">
+        <a:defRPr kumimoji="1" sz="1978" kern="1200">
           <a:solidFill>
             <a:schemeClr val="tx1"/>
           </a:solidFill>
@@ -3201,13 +3201,13 @@
           <a:cs typeface="+mn-cs"/>
         </a:defRPr>
       </a:lvl6pPr>
-      <a:lvl7pPr marL="3376840" indent="-259756" algn="l" defTabSz="1039029" rtl="0" eaLnBrk="1" latinLnBrk="0" hangingPunct="1">
+      <a:lvl7pPr marL="2937796" indent="-225983" algn="l" defTabSz="903939" rtl="0" eaLnBrk="1" latinLnBrk="0" hangingPunct="1">
         <a:spcBef>
           <a:spcPct val="20000"/>
         </a:spcBef>
         <a:buFont typeface="Arial" pitchFamily="34" charset="0"/>
         <a:buChar char="•"/>
-        <a:defRPr kumimoji="1" sz="2273" kern="1200">
+        <a:defRPr kumimoji="1" sz="1978" kern="1200">
           <a:solidFill>
             <a:schemeClr val="tx1"/>
           </a:solidFill>
@@ -3216,13 +3216,13 @@
           <a:cs typeface="+mn-cs"/>
         </a:defRPr>
       </a:lvl7pPr>
-      <a:lvl8pPr marL="3896355" indent="-259756" algn="l" defTabSz="1039029" rtl="0" eaLnBrk="1" latinLnBrk="0" hangingPunct="1">
+      <a:lvl8pPr marL="3389767" indent="-225983" algn="l" defTabSz="903939" rtl="0" eaLnBrk="1" latinLnBrk="0" hangingPunct="1">
         <a:spcBef>
           <a:spcPct val="20000"/>
         </a:spcBef>
         <a:buFont typeface="Arial" pitchFamily="34" charset="0"/>
         <a:buChar char="•"/>
-        <a:defRPr kumimoji="1" sz="2273" kern="1200">
+        <a:defRPr kumimoji="1" sz="1978" kern="1200">
           <a:solidFill>
             <a:schemeClr val="tx1"/>
           </a:solidFill>
@@ -3231,13 +3231,13 @@
           <a:cs typeface="+mn-cs"/>
         </a:defRPr>
       </a:lvl8pPr>
-      <a:lvl9pPr marL="4415868" indent="-259756" algn="l" defTabSz="1039029" rtl="0" eaLnBrk="1" latinLnBrk="0" hangingPunct="1">
+      <a:lvl9pPr marL="3841734" indent="-225983" algn="l" defTabSz="903939" rtl="0" eaLnBrk="1" latinLnBrk="0" hangingPunct="1">
         <a:spcBef>
           <a:spcPct val="20000"/>
         </a:spcBef>
         <a:buFont typeface="Arial" pitchFamily="34" charset="0"/>
         <a:buChar char="•"/>
-        <a:defRPr kumimoji="1" sz="2273" kern="1200">
+        <a:defRPr kumimoji="1" sz="1978" kern="1200">
           <a:solidFill>
             <a:schemeClr val="tx1"/>
           </a:solidFill>
@@ -3251,8 +3251,8 @@
       <a:defPPr>
         <a:defRPr lang="ja-JP"/>
       </a:defPPr>
-      <a:lvl1pPr marL="0" algn="l" defTabSz="1039029" rtl="0" eaLnBrk="1" latinLnBrk="0" hangingPunct="1">
-        <a:defRPr kumimoji="1" sz="2046" kern="1200">
+      <a:lvl1pPr marL="0" algn="l" defTabSz="903939" rtl="0" eaLnBrk="1" latinLnBrk="0" hangingPunct="1">
+        <a:defRPr kumimoji="1" sz="1780" kern="1200">
           <a:solidFill>
             <a:schemeClr val="tx1"/>
           </a:solidFill>
@@ -3261,8 +3261,8 @@
           <a:cs typeface="+mn-cs"/>
         </a:defRPr>
       </a:lvl1pPr>
-      <a:lvl2pPr marL="519515" algn="l" defTabSz="1039029" rtl="0" eaLnBrk="1" latinLnBrk="0" hangingPunct="1">
-        <a:defRPr kumimoji="1" sz="2046" kern="1200">
+      <a:lvl2pPr marL="451969" algn="l" defTabSz="903939" rtl="0" eaLnBrk="1" latinLnBrk="0" hangingPunct="1">
+        <a:defRPr kumimoji="1" sz="1780" kern="1200">
           <a:solidFill>
             <a:schemeClr val="tx1"/>
           </a:solidFill>
@@ -3271,8 +3271,8 @@
           <a:cs typeface="+mn-cs"/>
         </a:defRPr>
       </a:lvl2pPr>
-      <a:lvl3pPr marL="1039029" algn="l" defTabSz="1039029" rtl="0" eaLnBrk="1" latinLnBrk="0" hangingPunct="1">
-        <a:defRPr kumimoji="1" sz="2046" kern="1200">
+      <a:lvl3pPr marL="903939" algn="l" defTabSz="903939" rtl="0" eaLnBrk="1" latinLnBrk="0" hangingPunct="1">
+        <a:defRPr kumimoji="1" sz="1780" kern="1200">
           <a:solidFill>
             <a:schemeClr val="tx1"/>
           </a:solidFill>
@@ -3281,8 +3281,8 @@
           <a:cs typeface="+mn-cs"/>
         </a:defRPr>
       </a:lvl3pPr>
-      <a:lvl4pPr marL="1558542" algn="l" defTabSz="1039029" rtl="0" eaLnBrk="1" latinLnBrk="0" hangingPunct="1">
-        <a:defRPr kumimoji="1" sz="2046" kern="1200">
+      <a:lvl4pPr marL="1355906" algn="l" defTabSz="903939" rtl="0" eaLnBrk="1" latinLnBrk="0" hangingPunct="1">
+        <a:defRPr kumimoji="1" sz="1780" kern="1200">
           <a:solidFill>
             <a:schemeClr val="tx1"/>
           </a:solidFill>
@@ -3291,8 +3291,8 @@
           <a:cs typeface="+mn-cs"/>
         </a:defRPr>
       </a:lvl4pPr>
-      <a:lvl5pPr marL="2078055" algn="l" defTabSz="1039029" rtl="0" eaLnBrk="1" latinLnBrk="0" hangingPunct="1">
-        <a:defRPr kumimoji="1" sz="2046" kern="1200">
+      <a:lvl5pPr marL="1807876" algn="l" defTabSz="903939" rtl="0" eaLnBrk="1" latinLnBrk="0" hangingPunct="1">
+        <a:defRPr kumimoji="1" sz="1780" kern="1200">
           <a:solidFill>
             <a:schemeClr val="tx1"/>
           </a:solidFill>
@@ -3301,8 +3301,8 @@
           <a:cs typeface="+mn-cs"/>
         </a:defRPr>
       </a:lvl5pPr>
-      <a:lvl6pPr marL="2597570" algn="l" defTabSz="1039029" rtl="0" eaLnBrk="1" latinLnBrk="0" hangingPunct="1">
-        <a:defRPr kumimoji="1" sz="2046" kern="1200">
+      <a:lvl6pPr marL="2259845" algn="l" defTabSz="903939" rtl="0" eaLnBrk="1" latinLnBrk="0" hangingPunct="1">
+        <a:defRPr kumimoji="1" sz="1780" kern="1200">
           <a:solidFill>
             <a:schemeClr val="tx1"/>
           </a:solidFill>
@@ -3311,8 +3311,8 @@
           <a:cs typeface="+mn-cs"/>
         </a:defRPr>
       </a:lvl6pPr>
-      <a:lvl7pPr marL="3117083" algn="l" defTabSz="1039029" rtl="0" eaLnBrk="1" latinLnBrk="0" hangingPunct="1">
-        <a:defRPr kumimoji="1" sz="2046" kern="1200">
+      <a:lvl7pPr marL="2711813" algn="l" defTabSz="903939" rtl="0" eaLnBrk="1" latinLnBrk="0" hangingPunct="1">
+        <a:defRPr kumimoji="1" sz="1780" kern="1200">
           <a:solidFill>
             <a:schemeClr val="tx1"/>
           </a:solidFill>
@@ -3321,8 +3321,8 @@
           <a:cs typeface="+mn-cs"/>
         </a:defRPr>
       </a:lvl7pPr>
-      <a:lvl8pPr marL="3636598" algn="l" defTabSz="1039029" rtl="0" eaLnBrk="1" latinLnBrk="0" hangingPunct="1">
-        <a:defRPr kumimoji="1" sz="2046" kern="1200">
+      <a:lvl8pPr marL="3163783" algn="l" defTabSz="903939" rtl="0" eaLnBrk="1" latinLnBrk="0" hangingPunct="1">
+        <a:defRPr kumimoji="1" sz="1780" kern="1200">
           <a:solidFill>
             <a:schemeClr val="tx1"/>
           </a:solidFill>
@@ -3331,8 +3331,8 @@
           <a:cs typeface="+mn-cs"/>
         </a:defRPr>
       </a:lvl8pPr>
-      <a:lvl9pPr marL="4156111" algn="l" defTabSz="1039029" rtl="0" eaLnBrk="1" latinLnBrk="0" hangingPunct="1">
-        <a:defRPr kumimoji="1" sz="2046" kern="1200">
+      <a:lvl9pPr marL="3615749" algn="l" defTabSz="903939" rtl="0" eaLnBrk="1" latinLnBrk="0" hangingPunct="1">
+        <a:defRPr kumimoji="1" sz="1780" kern="1200">
           <a:solidFill>
             <a:schemeClr val="tx1"/>
           </a:solidFill>
@@ -3365,13 +3365,13 @@
       </p:grpSpPr>
       <p:sp>
         <p:nvSpPr>
-          <p:cNvPr id="200" name="円/楕円 199"/>
+          <p:cNvPr id="119" name="円/楕円 118"/>
           <p:cNvSpPr/>
           <p:nvPr/>
         </p:nvSpPr>
         <p:spPr>
           <a:xfrm>
-            <a:off x="373968" y="46777"/>
+            <a:off x="175754" y="46777"/>
             <a:ext cx="1759848" cy="767006"/>
           </a:xfrm>
           <a:prstGeom prst="ellipse">
@@ -3425,13 +3425,13 @@
       </p:sp>
       <p:sp>
         <p:nvSpPr>
-          <p:cNvPr id="201" name="正方形/長方形 200"/>
+          <p:cNvPr id="120" name="正方形/長方形 119"/>
           <p:cNvSpPr/>
           <p:nvPr/>
         </p:nvSpPr>
         <p:spPr>
           <a:xfrm>
-            <a:off x="373968" y="1243931"/>
+            <a:off x="175754" y="1243931"/>
             <a:ext cx="1759848" cy="1034712"/>
           </a:xfrm>
           <a:prstGeom prst="rect">
@@ -3501,14 +3501,14 @@
       </p:sp>
       <p:sp>
         <p:nvSpPr>
-          <p:cNvPr id="202" name="円/楕円 201"/>
+          <p:cNvPr id="121" name="円/楕円 120"/>
           <p:cNvSpPr/>
           <p:nvPr/>
         </p:nvSpPr>
         <p:spPr>
           <a:xfrm>
-            <a:off x="72083" y="2560269"/>
-            <a:ext cx="2363618" cy="1436535"/>
+            <a:off x="77247" y="3205912"/>
+            <a:ext cx="1956862" cy="1101764"/>
           </a:xfrm>
           <a:prstGeom prst="ellipse">
             <a:avLst/>
@@ -3536,24 +3536,11 @@
           <a:p>
             <a:pPr algn="ctr"/>
             <a:r>
-              <a:rPr lang="en-US" altLang="ja-JP" sz="2000" b="1" dirty="0">
-                <a:latin typeface="Times New Roman" pitchFamily="18" charset="0"/>
-                <a:cs typeface="Times New Roman" pitchFamily="18" charset="0"/>
-              </a:rPr>
-              <a:t>Call-by-value</a:t>
-            </a:r>
-            <a:br>
-              <a:rPr lang="en-US" altLang="ja-JP" sz="2000" b="1" dirty="0">
-                <a:latin typeface="Times New Roman" pitchFamily="18" charset="0"/>
-                <a:cs typeface="Times New Roman" pitchFamily="18" charset="0"/>
-              </a:rPr>
-            </a:br>
-            <a:r>
               <a:rPr lang="en-US" altLang="ja-JP" sz="2000" b="1" dirty="0" smtClean="0">
                 <a:latin typeface="Times New Roman" pitchFamily="18" charset="0"/>
                 <a:cs typeface="Times New Roman" pitchFamily="18" charset="0"/>
               </a:rPr>
-              <a:t>Boolean</a:t>
+              <a:t>CBV</a:t>
             </a:r>
             <a:br>
               <a:rPr lang="en-US" altLang="ja-JP" sz="2000" b="1" dirty="0" smtClean="0">
@@ -3566,6 +3553,19 @@
                 <a:latin typeface="Times New Roman" pitchFamily="18" charset="0"/>
                 <a:cs typeface="Times New Roman" pitchFamily="18" charset="0"/>
               </a:rPr>
+              <a:t>Boolean</a:t>
+            </a:r>
+            <a:br>
+              <a:rPr lang="en-US" altLang="ja-JP" sz="2000" b="1" dirty="0" smtClean="0">
+                <a:latin typeface="Times New Roman" pitchFamily="18" charset="0"/>
+                <a:cs typeface="Times New Roman" pitchFamily="18" charset="0"/>
+              </a:rPr>
+            </a:br>
+            <a:r>
+              <a:rPr lang="en-US" altLang="ja-JP" sz="2000" b="1" dirty="0" smtClean="0">
+                <a:latin typeface="Times New Roman" pitchFamily="18" charset="0"/>
+                <a:cs typeface="Times New Roman" pitchFamily="18" charset="0"/>
+              </a:rPr>
               <a:t>Program</a:t>
             </a:r>
             <a:endParaRPr lang="ja-JP" altLang="en-US" sz="2000" b="1" dirty="0">
@@ -3577,13 +3577,13 @@
       </p:sp>
       <p:sp>
         <p:nvSpPr>
-          <p:cNvPr id="203" name="正方形/長方形 202"/>
+          <p:cNvPr id="122" name="正方形/長方形 121"/>
           <p:cNvSpPr/>
           <p:nvPr/>
         </p:nvSpPr>
         <p:spPr>
           <a:xfrm>
-            <a:off x="6696819" y="4291671"/>
+            <a:off x="4422582" y="5270230"/>
             <a:ext cx="2074212" cy="1058616"/>
           </a:xfrm>
           <a:prstGeom prst="rect">
@@ -3667,16 +3667,16 @@
       </p:sp>
       <p:cxnSp>
         <p:nvCxnSpPr>
-          <p:cNvPr id="204" name="直線矢印コネクタ 203"/>
+          <p:cNvPr id="123" name="直線矢印コネクタ 122"/>
           <p:cNvCxnSpPr>
-            <a:stCxn id="200" idx="4"/>
-            <a:endCxn id="201" idx="0"/>
+            <a:stCxn id="119" idx="4"/>
+            <a:endCxn id="120" idx="0"/>
           </p:cNvCxnSpPr>
           <p:nvPr/>
         </p:nvCxnSpPr>
         <p:spPr>
           <a:xfrm>
-            <a:off x="1253892" y="813783"/>
+            <a:off x="1055678" y="813783"/>
             <a:ext cx="0" cy="430148"/>
           </a:xfrm>
           <a:prstGeom prst="straightConnector1">
@@ -3704,17 +3704,17 @@
       </p:cxnSp>
       <p:cxnSp>
         <p:nvCxnSpPr>
-          <p:cNvPr id="205" name="直線矢印コネクタ 204"/>
+          <p:cNvPr id="124" name="直線矢印コネクタ 123"/>
           <p:cNvCxnSpPr>
-            <a:stCxn id="201" idx="2"/>
-            <a:endCxn id="202" idx="0"/>
+            <a:stCxn id="120" idx="2"/>
+            <a:endCxn id="121" idx="0"/>
           </p:cNvCxnSpPr>
           <p:nvPr/>
         </p:nvCxnSpPr>
         <p:spPr>
           <a:xfrm>
-            <a:off x="1253892" y="2278643"/>
-            <a:ext cx="0" cy="281626"/>
+            <a:off x="1055678" y="2278643"/>
+            <a:ext cx="0" cy="927269"/>
           </a:xfrm>
           <a:prstGeom prst="straightConnector1">
             <a:avLst/>
@@ -3741,17 +3741,17 @@
       </p:cxnSp>
       <p:cxnSp>
         <p:nvCxnSpPr>
-          <p:cNvPr id="206" name="直線矢印コネクタ 205"/>
+          <p:cNvPr id="125" name="直線矢印コネクタ 124"/>
           <p:cNvCxnSpPr>
-            <a:stCxn id="202" idx="4"/>
-            <a:endCxn id="220" idx="0"/>
+            <a:stCxn id="121" idx="4"/>
+            <a:endCxn id="139" idx="0"/>
           </p:cNvCxnSpPr>
           <p:nvPr/>
         </p:nvCxnSpPr>
         <p:spPr>
           <a:xfrm>
-            <a:off x="1253892" y="3996804"/>
-            <a:ext cx="0" cy="294867"/>
+            <a:off x="1055678" y="4307676"/>
+            <a:ext cx="0" cy="941050"/>
           </a:xfrm>
           <a:prstGeom prst="straightConnector1">
             <a:avLst/>
@@ -3778,13 +3778,13 @@
       </p:cxnSp>
       <p:sp>
         <p:nvSpPr>
-          <p:cNvPr id="207" name="テキスト ボックス 206"/>
+          <p:cNvPr id="126" name="テキスト ボックス 125"/>
           <p:cNvSpPr txBox="1"/>
           <p:nvPr/>
         </p:nvSpPr>
         <p:spPr>
           <a:xfrm>
-            <a:off x="7391629" y="5782338"/>
+            <a:off x="7452221" y="5597408"/>
             <a:ext cx="684593" cy="404259"/>
           </a:xfrm>
           <a:prstGeom prst="rect">
@@ -3800,13 +3800,13 @@
           <a:p>
             <a:pPr algn="ctr"/>
             <a:r>
-              <a:rPr lang="en-US" altLang="ja-JP" sz="2000" b="1" dirty="0">
+              <a:rPr lang="en-US" altLang="ja-JP" sz="2400" b="1" dirty="0">
                 <a:latin typeface="Times New Roman" pitchFamily="18" charset="0"/>
                 <a:cs typeface="Times New Roman" pitchFamily="18" charset="0"/>
               </a:rPr>
               <a:t>safe</a:t>
             </a:r>
-            <a:endParaRPr lang="ja-JP" altLang="en-US" sz="2000" b="1" dirty="0">
+            <a:endParaRPr lang="ja-JP" altLang="en-US" sz="2400" b="1" dirty="0">
               <a:latin typeface="Times New Roman" pitchFamily="18" charset="0"/>
               <a:cs typeface="Times New Roman" pitchFamily="18" charset="0"/>
             </a:endParaRPr>
@@ -3815,17 +3815,17 @@
       </p:sp>
       <p:cxnSp>
         <p:nvCxnSpPr>
-          <p:cNvPr id="208" name="直線矢印コネクタ 207"/>
+          <p:cNvPr id="127" name="直線矢印コネクタ 126"/>
           <p:cNvCxnSpPr>
-            <a:stCxn id="203" idx="2"/>
-            <a:endCxn id="207" idx="0"/>
+            <a:stCxn id="122" idx="3"/>
+            <a:endCxn id="126" idx="1"/>
           </p:cNvCxnSpPr>
           <p:nvPr/>
         </p:nvCxnSpPr>
         <p:spPr>
           <a:xfrm>
-            <a:off x="7733925" y="5350287"/>
-            <a:ext cx="1" cy="432051"/>
+            <a:off x="6496794" y="5799538"/>
+            <a:ext cx="955427" cy="0"/>
           </a:xfrm>
           <a:prstGeom prst="straightConnector1">
             <a:avLst/>
@@ -3852,13 +3852,13 @@
       </p:cxnSp>
       <p:sp>
         <p:nvSpPr>
-          <p:cNvPr id="209" name="正方形/長方形 208"/>
+          <p:cNvPr id="128" name="正方形/長方形 127"/>
           <p:cNvSpPr/>
           <p:nvPr/>
         </p:nvSpPr>
         <p:spPr>
           <a:xfrm>
-            <a:off x="6965240" y="1243931"/>
+            <a:off x="4691003" y="2656438"/>
             <a:ext cx="1537371" cy="1034712"/>
           </a:xfrm>
           <a:prstGeom prst="rect">
@@ -3900,11 +3900,11 @@
               </a:rPr>
             </a:br>
             <a:r>
-              <a:rPr lang="en-US" altLang="ja-JP" sz="2000" b="1" dirty="0" err="1" smtClean="0">
+              <a:rPr lang="en-US" altLang="ja-JP" sz="2000" b="1" dirty="0" smtClean="0">
                 <a:latin typeface="Times New Roman" pitchFamily="18" charset="0"/>
                 <a:cs typeface="Times New Roman" pitchFamily="18" charset="0"/>
               </a:rPr>
-              <a:t>Unsafety</a:t>
+              <a:t>Feasibility</a:t>
             </a:r>
             <a:r>
               <a:rPr lang="en-US" altLang="ja-JP" sz="2000" b="1" dirty="0">
@@ -3935,13 +3935,13 @@
       </p:sp>
       <p:sp>
         <p:nvSpPr>
-          <p:cNvPr id="210" name="正方形/長方形 209"/>
+          <p:cNvPr id="129" name="正方形/長方形 128"/>
           <p:cNvSpPr/>
           <p:nvPr/>
         </p:nvSpPr>
         <p:spPr>
           <a:xfrm>
-            <a:off x="4896619" y="1250110"/>
+            <a:off x="4664949" y="1250110"/>
             <a:ext cx="1589479" cy="1034712"/>
           </a:xfrm>
           <a:prstGeom prst="rect">
@@ -4011,13 +4011,13 @@
       </p:sp>
       <p:sp>
         <p:nvSpPr>
-          <p:cNvPr id="211" name="円/楕円 210"/>
+          <p:cNvPr id="130" name="円/楕円 129"/>
           <p:cNvSpPr/>
           <p:nvPr/>
         </p:nvSpPr>
         <p:spPr>
           <a:xfrm>
-            <a:off x="2592363" y="1332661"/>
+            <a:off x="2394149" y="1332661"/>
             <a:ext cx="1872729" cy="857259"/>
           </a:xfrm>
           <a:prstGeom prst="ellipse">
@@ -4061,17 +4061,17 @@
       </p:sp>
       <p:cxnSp>
         <p:nvCxnSpPr>
-          <p:cNvPr id="212" name="直線矢印コネクタ 211"/>
+          <p:cNvPr id="131" name="直線矢印コネクタ 130"/>
           <p:cNvCxnSpPr>
-            <a:stCxn id="203" idx="0"/>
-            <a:endCxn id="28" idx="4"/>
+            <a:stCxn id="122" idx="0"/>
+            <a:endCxn id="143" idx="4"/>
           </p:cNvCxnSpPr>
           <p:nvPr/>
         </p:nvCxnSpPr>
         <p:spPr>
-          <a:xfrm flipH="1" flipV="1">
-            <a:off x="7733924" y="3683412"/>
-            <a:ext cx="1" cy="608259"/>
+          <a:xfrm flipV="1">
+            <a:off x="5459688" y="4878285"/>
+            <a:ext cx="1" cy="391945"/>
           </a:xfrm>
           <a:prstGeom prst="straightConnector1">
             <a:avLst/>
@@ -4098,17 +4098,17 @@
       </p:cxnSp>
       <p:cxnSp>
         <p:nvCxnSpPr>
-          <p:cNvPr id="213" name="直線矢印コネクタ 212"/>
+          <p:cNvPr id="132" name="直線矢印コネクタ 131"/>
           <p:cNvCxnSpPr>
-            <a:stCxn id="209" idx="1"/>
-            <a:endCxn id="210" idx="3"/>
+            <a:stCxn id="128" idx="0"/>
+            <a:endCxn id="129" idx="2"/>
           </p:cNvCxnSpPr>
           <p:nvPr/>
         </p:nvCxnSpPr>
         <p:spPr>
-          <a:xfrm flipH="1">
-            <a:off x="6486098" y="1761287"/>
-            <a:ext cx="479142" cy="6179"/>
+          <a:xfrm flipV="1">
+            <a:off x="5459689" y="2284822"/>
+            <a:ext cx="0" cy="371616"/>
           </a:xfrm>
           <a:prstGeom prst="straightConnector1">
             <a:avLst/>
@@ -4135,17 +4135,17 @@
       </p:cxnSp>
       <p:cxnSp>
         <p:nvCxnSpPr>
-          <p:cNvPr id="214" name="直線矢印コネクタ 213"/>
+          <p:cNvPr id="133" name="直線矢印コネクタ 132"/>
           <p:cNvCxnSpPr>
-            <a:stCxn id="210" idx="1"/>
-            <a:endCxn id="211" idx="6"/>
+            <a:stCxn id="129" idx="1"/>
+            <a:endCxn id="130" idx="6"/>
           </p:cNvCxnSpPr>
           <p:nvPr/>
         </p:nvCxnSpPr>
         <p:spPr>
           <a:xfrm flipH="1" flipV="1">
-            <a:off x="4465092" y="1761291"/>
-            <a:ext cx="431527" cy="6175"/>
+            <a:off x="4266878" y="1761291"/>
+            <a:ext cx="398071" cy="6175"/>
           </a:xfrm>
           <a:prstGeom prst="straightConnector1">
             <a:avLst/>
@@ -4172,16 +4172,16 @@
       </p:cxnSp>
       <p:cxnSp>
         <p:nvCxnSpPr>
-          <p:cNvPr id="215" name="直線矢印コネクタ 214"/>
+          <p:cNvPr id="134" name="直線矢印コネクタ 133"/>
           <p:cNvCxnSpPr>
-            <a:stCxn id="211" idx="2"/>
-            <a:endCxn id="201" idx="3"/>
+            <a:stCxn id="130" idx="2"/>
+            <a:endCxn id="120" idx="3"/>
           </p:cNvCxnSpPr>
           <p:nvPr/>
         </p:nvCxnSpPr>
         <p:spPr>
           <a:xfrm flipH="1" flipV="1">
-            <a:off x="2133816" y="1761287"/>
+            <a:off x="1935602" y="1761287"/>
             <a:ext cx="458547" cy="4"/>
           </a:xfrm>
           <a:prstGeom prst="straightConnector1">
@@ -4209,14 +4209,14 @@
       </p:cxnSp>
       <p:sp>
         <p:nvSpPr>
-          <p:cNvPr id="216" name="テキスト ボックス 215"/>
+          <p:cNvPr id="135" name="テキスト ボックス 134"/>
           <p:cNvSpPr txBox="1"/>
           <p:nvPr/>
         </p:nvSpPr>
         <p:spPr>
           <a:xfrm>
-            <a:off x="7265872" y="309437"/>
-            <a:ext cx="936105" cy="530235"/>
+            <a:off x="7452221" y="2908676"/>
+            <a:ext cx="1080120" cy="530235"/>
           </a:xfrm>
           <a:prstGeom prst="rect">
             <a:avLst/>
@@ -4231,7 +4231,7 @@
           <a:p>
             <a:pPr algn="ctr"/>
             <a:r>
-              <a:rPr lang="en-US" altLang="ja-JP" sz="2000" b="1" dirty="0">
+              <a:rPr lang="en-US" altLang="ja-JP" sz="2400" b="1" dirty="0">
                 <a:latin typeface="Times New Roman" pitchFamily="18" charset="0"/>
                 <a:cs typeface="Times New Roman" pitchFamily="18" charset="0"/>
               </a:rPr>
@@ -4246,17 +4246,17 @@
       </p:sp>
       <p:cxnSp>
         <p:nvCxnSpPr>
-          <p:cNvPr id="217" name="直線矢印コネクタ 216"/>
+          <p:cNvPr id="136" name="直線矢印コネクタ 135"/>
           <p:cNvCxnSpPr>
-            <a:stCxn id="209" idx="0"/>
-            <a:endCxn id="216" idx="2"/>
+            <a:stCxn id="128" idx="3"/>
+            <a:endCxn id="135" idx="1"/>
           </p:cNvCxnSpPr>
           <p:nvPr/>
         </p:nvCxnSpPr>
         <p:spPr>
-          <a:xfrm flipH="1" flipV="1">
-            <a:off x="7733925" y="839672"/>
-            <a:ext cx="1" cy="404259"/>
+          <a:xfrm>
+            <a:off x="6228374" y="3173794"/>
+            <a:ext cx="1223847" cy="0"/>
           </a:xfrm>
           <a:prstGeom prst="straightConnector1">
             <a:avLst/>
@@ -4283,13 +4283,13 @@
       </p:cxnSp>
       <p:sp>
         <p:nvSpPr>
-          <p:cNvPr id="218" name="テキスト ボックス 217"/>
+          <p:cNvPr id="137" name="テキスト ボックス 136"/>
           <p:cNvSpPr txBox="1"/>
           <p:nvPr/>
         </p:nvSpPr>
         <p:spPr>
           <a:xfrm>
-            <a:off x="7812736" y="5350290"/>
+            <a:off x="6467301" y="5461474"/>
             <a:ext cx="600654" cy="358093"/>
           </a:xfrm>
           <a:prstGeom prst="rect">
@@ -4319,13 +4319,13 @@
       </p:sp>
       <p:sp>
         <p:nvSpPr>
-          <p:cNvPr id="219" name="テキスト ボックス 218"/>
+          <p:cNvPr id="138" name="テキスト ボックス 137"/>
           <p:cNvSpPr txBox="1"/>
           <p:nvPr/>
         </p:nvSpPr>
         <p:spPr>
           <a:xfrm>
-            <a:off x="7801427" y="3910127"/>
+            <a:off x="5527190" y="4888686"/>
             <a:ext cx="469293" cy="410216"/>
           </a:xfrm>
           <a:prstGeom prst="rect">
@@ -4355,14 +4355,14 @@
       </p:sp>
       <p:sp>
         <p:nvSpPr>
-          <p:cNvPr id="220" name="正方形/長方形 219"/>
+          <p:cNvPr id="139" name="正方形/長方形 138"/>
           <p:cNvSpPr/>
           <p:nvPr/>
         </p:nvSpPr>
         <p:spPr>
           <a:xfrm>
-            <a:off x="275461" y="4291671"/>
-            <a:ext cx="1956862" cy="1058616"/>
+            <a:off x="175754" y="5248726"/>
+            <a:ext cx="1759848" cy="1058616"/>
           </a:xfrm>
           <a:prstGeom prst="rect">
             <a:avLst/>
@@ -4438,16 +4438,17 @@
       </p:sp>
       <p:cxnSp>
         <p:nvCxnSpPr>
-          <p:cNvPr id="221" name="直線矢印コネクタ 220"/>
+          <p:cNvPr id="140" name="直線矢印コネクタ 139"/>
           <p:cNvCxnSpPr>
-            <a:endCxn id="203" idx="1"/>
+            <a:stCxn id="141" idx="6"/>
+            <a:endCxn id="122" idx="1"/>
           </p:cNvCxnSpPr>
           <p:nvPr/>
         </p:nvCxnSpPr>
         <p:spPr>
-          <a:xfrm flipV="1">
-            <a:off x="4849099" y="4820979"/>
-            <a:ext cx="1847720" cy="3"/>
+          <a:xfrm>
+            <a:off x="4165759" y="5788436"/>
+            <a:ext cx="256823" cy="11102"/>
           </a:xfrm>
           <a:prstGeom prst="straightConnector1">
             <a:avLst/>
@@ -4474,14 +4475,14 @@
       </p:cxnSp>
       <p:sp>
         <p:nvSpPr>
-          <p:cNvPr id="222" name="円/楕円 221"/>
+          <p:cNvPr id="141" name="円/楕円 140"/>
           <p:cNvSpPr/>
           <p:nvPr/>
         </p:nvSpPr>
         <p:spPr>
           <a:xfrm>
-            <a:off x="3333460" y="4147661"/>
-            <a:ext cx="2365187" cy="1346642"/>
+            <a:off x="2267645" y="5248726"/>
+            <a:ext cx="1898114" cy="1079420"/>
           </a:xfrm>
           <a:prstGeom prst="ellipse">
             <a:avLst/>
@@ -4513,7 +4514,7 @@
                 <a:latin typeface="Times New Roman" pitchFamily="18" charset="0"/>
                 <a:cs typeface="Times New Roman" pitchFamily="18" charset="0"/>
               </a:rPr>
-              <a:t>Call-by-name</a:t>
+              <a:t>CBN</a:t>
             </a:r>
             <a:br>
               <a:rPr lang="en-US" altLang="ja-JP" sz="2000" b="1" dirty="0" smtClean="0">
@@ -4547,17 +4548,17 @@
       </p:sp>
       <p:cxnSp>
         <p:nvCxnSpPr>
-          <p:cNvPr id="223" name="直線矢印コネクタ 222"/>
+          <p:cNvPr id="142" name="直線矢印コネクタ 141"/>
           <p:cNvCxnSpPr>
-            <a:stCxn id="220" idx="3"/>
-            <a:endCxn id="222" idx="2"/>
+            <a:stCxn id="139" idx="3"/>
+            <a:endCxn id="141" idx="2"/>
           </p:cNvCxnSpPr>
           <p:nvPr/>
         </p:nvCxnSpPr>
         <p:spPr>
           <a:xfrm>
-            <a:off x="2232323" y="4820979"/>
-            <a:ext cx="1101137" cy="3"/>
+            <a:off x="1935602" y="5778034"/>
+            <a:ext cx="332043" cy="10402"/>
           </a:xfrm>
           <a:prstGeom prst="straightConnector1">
             <a:avLst/>
@@ -4584,13 +4585,13 @@
       </p:cxnSp>
       <p:sp>
         <p:nvSpPr>
-          <p:cNvPr id="28" name="円/楕円 27"/>
+          <p:cNvPr id="143" name="円/楕円 142"/>
           <p:cNvSpPr/>
           <p:nvPr/>
         </p:nvSpPr>
         <p:spPr>
           <a:xfrm>
-            <a:off x="6797559" y="2826153"/>
+            <a:off x="4523324" y="4021026"/>
             <a:ext cx="1872729" cy="857259"/>
           </a:xfrm>
           <a:prstGeom prst="ellipse">
@@ -4634,17 +4635,17 @@
       </p:sp>
       <p:cxnSp>
         <p:nvCxnSpPr>
-          <p:cNvPr id="32" name="直線矢印コネクタ 31"/>
+          <p:cNvPr id="144" name="直線矢印コネクタ 143"/>
           <p:cNvCxnSpPr>
-            <a:stCxn id="28" idx="0"/>
-            <a:endCxn id="209" idx="2"/>
+            <a:stCxn id="143" idx="0"/>
+            <a:endCxn id="128" idx="2"/>
           </p:cNvCxnSpPr>
           <p:nvPr/>
         </p:nvCxnSpPr>
         <p:spPr>
           <a:xfrm flipV="1">
-            <a:off x="7733924" y="2278643"/>
-            <a:ext cx="2" cy="547510"/>
+            <a:off x="5459689" y="3691150"/>
+            <a:ext cx="0" cy="329876"/>
           </a:xfrm>
           <a:prstGeom prst="straightConnector1">
             <a:avLst/>
@@ -4669,6 +4670,87 @@
           </a:fontRef>
         </p:style>
       </p:cxnSp>
+      <p:sp>
+        <p:nvSpPr>
+          <p:cNvPr id="145" name="テキスト ボックス 144"/>
+          <p:cNvSpPr txBox="1"/>
+          <p:nvPr/>
+        </p:nvSpPr>
+        <p:spPr>
+          <a:xfrm>
+            <a:off x="6228085" y="3088486"/>
+            <a:ext cx="1008112" cy="530235"/>
+          </a:xfrm>
+          <a:prstGeom prst="rect">
+            <a:avLst/>
+          </a:prstGeom>
+          <a:noFill/>
+        </p:spPr>
+        <p:txBody>
+          <a:bodyPr wrap="square" lIns="91424" tIns="45711" rIns="91424" bIns="45711" rtlCol="0" anchor="ctr" anchorCtr="1">
+            <a:noAutofit/>
+          </a:bodyPr>
+          <a:lstStyle/>
+          <a:p>
+            <a:pPr algn="ctr"/>
+            <a:r>
+              <a:rPr lang="en-US" altLang="ja-JP" sz="2000" b="1" dirty="0">
+                <a:latin typeface="Times New Roman" pitchFamily="18" charset="0"/>
+                <a:cs typeface="Times New Roman" pitchFamily="18" charset="0"/>
+              </a:rPr>
+              <a:t>f</a:t>
+            </a:r>
+            <a:r>
+              <a:rPr lang="en-US" altLang="ja-JP" sz="2000" b="1" dirty="0" smtClean="0">
+                <a:latin typeface="Times New Roman" pitchFamily="18" charset="0"/>
+                <a:cs typeface="Times New Roman" pitchFamily="18" charset="0"/>
+              </a:rPr>
+              <a:t>easible</a:t>
+            </a:r>
+            <a:endParaRPr lang="ja-JP" altLang="en-US" sz="2000" b="1" dirty="0">
+              <a:latin typeface="Times New Roman" pitchFamily="18" charset="0"/>
+              <a:cs typeface="Times New Roman" pitchFamily="18" charset="0"/>
+            </a:endParaRPr>
+          </a:p>
+        </p:txBody>
+      </p:sp>
+      <p:sp>
+        <p:nvSpPr>
+          <p:cNvPr id="146" name="テキスト ボックス 145"/>
+          <p:cNvSpPr txBox="1"/>
+          <p:nvPr/>
+        </p:nvSpPr>
+        <p:spPr>
+          <a:xfrm>
+            <a:off x="5591285" y="2196604"/>
+            <a:ext cx="1212864" cy="530235"/>
+          </a:xfrm>
+          <a:prstGeom prst="rect">
+            <a:avLst/>
+          </a:prstGeom>
+          <a:noFill/>
+        </p:spPr>
+        <p:txBody>
+          <a:bodyPr wrap="square" lIns="91424" tIns="45711" rIns="91424" bIns="45711" rtlCol="0" anchor="ctr" anchorCtr="1">
+            <a:noAutofit/>
+          </a:bodyPr>
+          <a:lstStyle/>
+          <a:p>
+            <a:pPr algn="ctr"/>
+            <a:r>
+              <a:rPr lang="en-US" altLang="ja-JP" sz="2000" b="1" dirty="0" smtClean="0">
+                <a:latin typeface="Times New Roman" pitchFamily="18" charset="0"/>
+                <a:cs typeface="Times New Roman" pitchFamily="18" charset="0"/>
+              </a:rPr>
+              <a:t>infeasible</a:t>
+            </a:r>
+            <a:endParaRPr lang="ja-JP" altLang="en-US" sz="2000" b="1" dirty="0">
+              <a:latin typeface="Times New Roman" pitchFamily="18" charset="0"/>
+              <a:cs typeface="Times New Roman" pitchFamily="18" charset="0"/>
+            </a:endParaRPr>
+          </a:p>
+        </p:txBody>
+      </p:sp>
     </p:spTree>
     <p:extLst>
       <p:ext uri="{BB962C8B-B14F-4D97-AF65-F5344CB8AC3E}">

</xml_diff>